<commit_message>
add the presentation file others please add your slide
</commit_message>
<xml_diff>
--- a/UMKC Hackathon Kool Aid.pptx
+++ b/UMKC Hackathon Kool Aid.pptx
@@ -9,6 +9,7 @@
     <p:sldId id="256" r:id="rId3"/>
     <p:sldId id="257" r:id="rId4"/>
     <p:sldId id="258" r:id="rId5"/>
+    <p:sldId id="259" r:id="rId6"/>
   </p:sldIdLst>
   <p:sldSz cx="9144000" cy="6858000" type="screen4x3"/>
   <p:notesSz cx="6858000" cy="9144000"/>
@@ -6118,12 +6119,8 @@
           <a:lstStyle/>
           <a:p>
             <a:r>
-              <a:rPr lang="en-US"/>
-              <a:t>Team : Kool </a:t>
-            </a:r>
-            <a:r>
               <a:rPr lang="en-US" dirty="0"/>
-              <a:t>Aid</a:t>
+              <a:t>Team : Kool Aid</a:t>
             </a:r>
             <a:br>
               <a:rPr lang="en-US" dirty="0"/>
@@ -6135,8 +6132,20 @@
           </a:p>
           <a:p>
             <a:r>
+              <a:rPr lang="en-US" dirty="0" err="1"/>
+              <a:t>Manvitha</a:t>
+            </a:r>
+            <a:r>
               <a:rPr lang="en-US" dirty="0"/>
-              <a:t>Vmanvitha3, Liaquat Ali</a:t>
+              <a:t> </a:t>
+            </a:r>
+            <a:r>
+              <a:rPr lang="en-US" dirty="0" err="1"/>
+              <a:t>Vaduguru</a:t>
+            </a:r>
+            <a:r>
+              <a:rPr lang="en-US" dirty="0"/>
+              <a:t>, Liaquat Ali</a:t>
             </a:r>
           </a:p>
           <a:p>
@@ -6331,7 +6340,7 @@
                   <a:srgbClr val="0072BC"/>
                 </a:solidFill>
               </a:rPr>
-              <a:t>Overview</a:t>
+              <a:t>Project Description</a:t>
             </a:r>
           </a:p>
         </p:txBody>
@@ -6348,7 +6357,9 @@
         </p:nvSpPr>
         <p:spPr/>
         <p:txBody>
-          <a:bodyPr/>
+          <a:bodyPr>
+            <a:normAutofit fontScale="77500" lnSpcReduction="20000"/>
+          </a:bodyPr>
           <a:lstStyle/>
           <a:p>
             <a:pPr lvl="0">
@@ -6358,56 +6369,172 @@
             </a:pPr>
             <a:r>
               <a:rPr lang="en-US" dirty="0"/>
-              <a:t>Click to edit Master text styles</a:t>
-            </a:r>
-          </a:p>
-          <a:p>
-            <a:pPr lvl="1"/>
-            <a:r>
-              <a:rPr lang="en-US" dirty="0"/>
-              <a:t>Second level</a:t>
-            </a:r>
-          </a:p>
-          <a:p>
-            <a:pPr lvl="2">
+              <a:t>The goal is to process the Reddit threads dataset to understand the hot topic people are talking about.</a:t>
+            </a:r>
+          </a:p>
+          <a:p>
+            <a:pPr lvl="0">
               <a:buClr>
                 <a:srgbClr val="0072BC"/>
               </a:buClr>
             </a:pPr>
             <a:r>
               <a:rPr lang="en-US" dirty="0"/>
-              <a:t>Third level</a:t>
-            </a:r>
-          </a:p>
-          <a:p>
-            <a:pPr lvl="3"/>
+              <a:t>After extracting top 10 news out of your dataset, use Google </a:t>
+            </a:r>
+            <a:r>
+              <a:rPr lang="en-US" dirty="0" err="1"/>
+              <a:t>Api</a:t>
+            </a:r>
             <a:r>
               <a:rPr lang="en-US" dirty="0"/>
-              <a:t>Fourth level</a:t>
-            </a:r>
-          </a:p>
-          <a:p>
-            <a:pPr lvl="4"/>
+              <a:t> to search through the google and find the most related pictures to the extracted news.</a:t>
+            </a:r>
+          </a:p>
+          <a:p>
+            <a:pPr lvl="0">
+              <a:buClr>
+                <a:srgbClr val="0072BC"/>
+              </a:buClr>
+            </a:pPr>
             <a:r>
               <a:rPr lang="en-US" dirty="0"/>
-              <a:t>Fifth level</a:t>
-            </a:r>
-          </a:p>
-          <a:p>
-            <a:endParaRPr lang="en-US" sz="2800" dirty="0"/>
-          </a:p>
-          <a:p>
-            <a:pPr marL="0" indent="0">
-              <a:buNone/>
+              <a:t>You should also consider the time in which the topic is related about to find the pictures related to that topic on special time saved on the dataset</a:t>
+            </a:r>
+          </a:p>
+          <a:p>
+            <a:pPr lvl="0">
+              <a:buClr>
+                <a:srgbClr val="0072BC"/>
+              </a:buClr>
             </a:pPr>
-            <a:endParaRPr lang="en-US" dirty="0"/>
+            <a:r>
+              <a:rPr lang="en-US" dirty="0"/>
+              <a:t>For detecting hot topics in the Reddit dataset, you may go for topic detection approach or clustering approach</a:t>
+            </a:r>
           </a:p>
         </p:txBody>
       </p:sp>
     </p:spTree>
     <p:extLst>
       <p:ext uri="{BB962C8B-B14F-4D97-AF65-F5344CB8AC3E}">
-        <p14:creationId xmlns:p14="http://schemas.microsoft.com/office/powerpoint/2010/main" val="1048393149"/>
+        <p14:creationId xmlns:p14="http://schemas.microsoft.com/office/powerpoint/2010/main" val="945174619"/>
+      </p:ext>
+    </p:extLst>
+  </p:cSld>
+  <p:clrMapOvr>
+    <a:masterClrMapping/>
+  </p:clrMapOvr>
+</p:sld>
+</file>
+
+<file path=ppt/slides/slide4.xml><?xml version="1.0" encoding="utf-8"?>
+<p:sld xmlns:a="http://schemas.openxmlformats.org/drawingml/2006/main" xmlns:r="http://schemas.openxmlformats.org/officeDocument/2006/relationships" xmlns:p="http://schemas.openxmlformats.org/presentationml/2006/main">
+  <p:cSld>
+    <p:spTree>
+      <p:nvGrpSpPr>
+        <p:cNvPr id="1" name=""/>
+        <p:cNvGrpSpPr/>
+        <p:nvPr/>
+      </p:nvGrpSpPr>
+      <p:grpSpPr>
+        <a:xfrm>
+          <a:off x="0" y="0"/>
+          <a:ext cx="0" cy="0"/>
+          <a:chOff x="0" y="0"/>
+          <a:chExt cx="0" cy="0"/>
+        </a:xfrm>
+      </p:grpSpPr>
+      <p:sp>
+        <p:nvSpPr>
+          <p:cNvPr id="2" name="Title 1">
+            <a:extLst>
+              <a:ext uri="{FF2B5EF4-FFF2-40B4-BE49-F238E27FC236}">
+                <a16:creationId xmlns:a16="http://schemas.microsoft.com/office/drawing/2014/main" id="{29613B9B-E9EB-4DA3-A8F5-D7B06BA11A10}"/>
+              </a:ext>
+            </a:extLst>
+          </p:cNvPr>
+          <p:cNvSpPr>
+            <a:spLocks noGrp="1"/>
+          </p:cNvSpPr>
+          <p:nvPr>
+            <p:ph type="title"/>
+          </p:nvPr>
+        </p:nvSpPr>
+        <p:spPr/>
+        <p:txBody>
+          <a:bodyPr/>
+          <a:lstStyle/>
+          <a:p>
+            <a:r>
+              <a:rPr lang="en-US" dirty="0"/>
+              <a:t>Webpage UI</a:t>
+            </a:r>
+          </a:p>
+        </p:txBody>
+      </p:sp>
+      <p:sp>
+        <p:nvSpPr>
+          <p:cNvPr id="3" name="Content Placeholder 2">
+            <a:extLst>
+              <a:ext uri="{FF2B5EF4-FFF2-40B4-BE49-F238E27FC236}">
+                <a16:creationId xmlns:a16="http://schemas.microsoft.com/office/drawing/2014/main" id="{D3C5DB27-4185-45CF-8E16-2FEF346DAC2C}"/>
+              </a:ext>
+            </a:extLst>
+          </p:cNvPr>
+          <p:cNvSpPr>
+            <a:spLocks noGrp="1"/>
+          </p:cNvSpPr>
+          <p:nvPr>
+            <p:ph idx="1"/>
+          </p:nvPr>
+        </p:nvSpPr>
+        <p:spPr/>
+        <p:txBody>
+          <a:bodyPr/>
+          <a:lstStyle/>
+          <a:p>
+            <a:r>
+              <a:rPr lang="en-US" dirty="0"/>
+              <a:t>I used the bootstrap and style.css for styling the webpage </a:t>
+            </a:r>
+          </a:p>
+        </p:txBody>
+      </p:sp>
+      <p:pic>
+        <p:nvPicPr>
+          <p:cNvPr id="5" name="Picture 4">
+            <a:extLst>
+              <a:ext uri="{FF2B5EF4-FFF2-40B4-BE49-F238E27FC236}">
+                <a16:creationId xmlns:a16="http://schemas.microsoft.com/office/drawing/2014/main" id="{935AB74B-9793-416D-B763-BF321669239F}"/>
+              </a:ext>
+            </a:extLst>
+          </p:cNvPr>
+          <p:cNvPicPr>
+            <a:picLocks noChangeAspect="1"/>
+          </p:cNvPicPr>
+          <p:nvPr/>
+        </p:nvPicPr>
+        <p:blipFill>
+          <a:blip r:embed="rId2"/>
+          <a:stretch>
+            <a:fillRect/>
+          </a:stretch>
+        </p:blipFill>
+        <p:spPr>
+          <a:xfrm>
+            <a:off x="457201" y="2883877"/>
+            <a:ext cx="8229600" cy="3424848"/>
+          </a:xfrm>
+          <a:prstGeom prst="rect">
+            <a:avLst/>
+          </a:prstGeom>
+        </p:spPr>
+      </p:pic>
+    </p:spTree>
+    <p:extLst>
+      <p:ext uri="{BB962C8B-B14F-4D97-AF65-F5344CB8AC3E}">
+        <p14:creationId xmlns:p14="http://schemas.microsoft.com/office/powerpoint/2010/main" val="3531253888"/>
       </p:ext>
     </p:extLst>
   </p:cSld>

</xml_diff>